<commit_message>
modified:   do_actions.c 	modified:   presentation.pptx 	modified:   set_config.c 	modified:   world.h
</commit_message>
<xml_diff>
--- a/presentation.pptx
+++ b/presentation.pptx
@@ -5,7 +5,7 @@
     <p:sldMasterId id="2147483648" r:id="rId1"/>
   </p:sldMasterIdLst>
   <p:notesMasterIdLst>
-    <p:notesMasterId r:id="rId9"/>
+    <p:notesMasterId r:id="rId10"/>
   </p:notesMasterIdLst>
   <p:sldIdLst>
     <p:sldId id="256" r:id="rId2"/>
@@ -15,6 +15,7 @@
     <p:sldId id="260" r:id="rId6"/>
     <p:sldId id="261" r:id="rId7"/>
     <p:sldId id="262" r:id="rId8"/>
+    <p:sldId id="263" r:id="rId9"/>
   </p:sldIdLst>
   <p:sldSz cx="12192000" cy="6858000"/>
   <p:notesSz cx="6858000" cy="9144000"/>
@@ -113,6 +114,11 @@
       </a:defRPr>
     </a:lvl9pPr>
   </p:defaultTextStyle>
+  <p:extLst>
+    <p:ext uri="{EFAFB233-063F-42B5-8137-9DF3F51BA10A}">
+      <p15:sldGuideLst xmlns:p15="http://schemas.microsoft.com/office/powerpoint/2012/main"/>
+    </p:ext>
+  </p:extLst>
 </p:presentation>
 </file>
 
@@ -4235,8 +4241,8 @@
           </a:p>
         </p:txBody>
       </p:sp>
-      <mc:AlternateContent xmlns:mc="http://schemas.openxmlformats.org/markup-compatibility/2006">
-        <mc:Choice xmlns:a14="http://schemas.microsoft.com/office/drawing/2010/main" Requires="a14">
+      <mc:AlternateContent xmlns:mc="http://schemas.openxmlformats.org/markup-compatibility/2006" xmlns:a14="http://schemas.microsoft.com/office/drawing/2010/main">
+        <mc:Choice Requires="a14">
           <p:sp>
             <p:nvSpPr>
               <p:cNvPr id="3" name="コンテンツ プレースホルダー 2">
@@ -4618,7 +4624,7 @@
             </p:txBody>
           </p:sp>
         </mc:Choice>
-        <mc:Fallback>
+        <mc:Fallback xmlns="">
           <p:sp>
             <p:nvSpPr>
               <p:cNvPr id="3" name="コンテンツ プレースホルダー 2">
@@ -4778,15 +4784,15 @@
             </a:pPr>
             <a:r>
               <a:rPr lang="en-US" altLang="ja-JP" dirty="0"/>
-              <a:t>1</a:t>
+              <a:t>action</a:t>
             </a:r>
             <a:r>
               <a:rPr lang="ja-JP" altLang="en-US" dirty="0"/>
-              <a:t>つ以上の</a:t>
+              <a:t>または</a:t>
             </a:r>
             <a:r>
               <a:rPr lang="en-US" altLang="ja-JP" dirty="0"/>
-              <a:t>action</a:t>
+              <a:t>pattern</a:t>
             </a:r>
             <a:r>
               <a:rPr lang="ja-JP" altLang="en-US" dirty="0"/>
@@ -4815,18 +4821,14 @@
             </a:pPr>
             <a:r>
               <a:rPr lang="ja-JP" altLang="en-US" dirty="0"/>
-              <a:t>プログラムの開始位置。</a:t>
-            </a:r>
-            <a:r>
-              <a:rPr lang="en-US" altLang="ja-JP" dirty="0"/>
-              <a:t>1</a:t>
-            </a:r>
-            <a:r>
-              <a:rPr lang="ja-JP" altLang="en-US" dirty="0"/>
-              <a:t>つ以上の</a:t>
-            </a:r>
-            <a:r>
-              <a:rPr lang="en-US" altLang="ja-JP" dirty="0"/>
+              <a:t>プログラムの開始</a:t>
+            </a:r>
+            <a:r>
+              <a:rPr lang="ja-JP" altLang="en-US"/>
+              <a:t>位置。</a:t>
+            </a:r>
+            <a:r>
+              <a:rPr lang="en-US" altLang="ja-JP"/>
               <a:t>action</a:t>
             </a:r>
             <a:r>
@@ -5573,6 +5575,101 @@
     <p:extLst>
       <p:ext uri="{BB962C8B-B14F-4D97-AF65-F5344CB8AC3E}">
         <p14:creationId xmlns:p14="http://schemas.microsoft.com/office/powerpoint/2010/main" val="4254739292"/>
+      </p:ext>
+    </p:extLst>
+  </p:cSld>
+  <p:clrMapOvr>
+    <a:masterClrMapping/>
+  </p:clrMapOvr>
+</p:sld>
+</file>
+
+<file path=ppt/slides/slide8.xml><?xml version="1.0" encoding="utf-8"?>
+<p:sld xmlns:a="http://schemas.openxmlformats.org/drawingml/2006/main" xmlns:r="http://schemas.openxmlformats.org/officeDocument/2006/relationships" xmlns:p="http://schemas.openxmlformats.org/presentationml/2006/main">
+  <p:cSld>
+    <p:spTree>
+      <p:nvGrpSpPr>
+        <p:cNvPr id="1" name=""/>
+        <p:cNvGrpSpPr/>
+        <p:nvPr/>
+      </p:nvGrpSpPr>
+      <p:grpSpPr>
+        <a:xfrm>
+          <a:off x="0" y="0"/>
+          <a:ext cx="0" cy="0"/>
+          <a:chOff x="0" y="0"/>
+          <a:chExt cx="0" cy="0"/>
+        </a:xfrm>
+      </p:grpSpPr>
+      <p:sp>
+        <p:nvSpPr>
+          <p:cNvPr id="2" name="タイトル 1">
+            <a:extLst>
+              <a:ext uri="{FF2B5EF4-FFF2-40B4-BE49-F238E27FC236}">
+                <a16:creationId xmlns:a16="http://schemas.microsoft.com/office/drawing/2014/main" id="{2C9C78E2-F2AE-4A34-90EC-902B7CA4B51D}"/>
+              </a:ext>
+            </a:extLst>
+          </p:cNvPr>
+          <p:cNvSpPr>
+            <a:spLocks noGrp="1"/>
+          </p:cNvSpPr>
+          <p:nvPr>
+            <p:ph type="title"/>
+          </p:nvPr>
+        </p:nvSpPr>
+        <p:spPr/>
+        <p:txBody>
+          <a:bodyPr/>
+          <a:lstStyle/>
+          <a:p>
+            <a:r>
+              <a:rPr lang="en-US" altLang="ja-JP" dirty="0"/>
+              <a:t>map</a:t>
+            </a:r>
+            <a:r>
+              <a:rPr lang="ja-JP" altLang="en-US" dirty="0"/>
+              <a:t>の例</a:t>
+            </a:r>
+            <a:endParaRPr kumimoji="1" lang="ja-JP" altLang="en-US" dirty="0"/>
+          </a:p>
+        </p:txBody>
+      </p:sp>
+      <p:pic>
+        <p:nvPicPr>
+          <p:cNvPr id="4" name="コンテンツ プレースホルダー 3">
+            <a:extLst>
+              <a:ext uri="{FF2B5EF4-FFF2-40B4-BE49-F238E27FC236}">
+                <a16:creationId xmlns:a16="http://schemas.microsoft.com/office/drawing/2014/main" id="{3309A9A4-26FD-4C7E-87C6-5323AA16F89E}"/>
+              </a:ext>
+            </a:extLst>
+          </p:cNvPr>
+          <p:cNvPicPr>
+            <a:picLocks noGrp="1" noChangeAspect="1"/>
+          </p:cNvPicPr>
+          <p:nvPr>
+            <p:ph idx="1"/>
+          </p:nvPr>
+        </p:nvPicPr>
+        <p:blipFill>
+          <a:blip r:embed="rId2"/>
+          <a:stretch>
+            <a:fillRect/>
+          </a:stretch>
+        </p:blipFill>
+        <p:spPr>
+          <a:xfrm>
+            <a:off x="838200" y="2904091"/>
+            <a:ext cx="10515600" cy="2194406"/>
+          </a:xfrm>
+          <a:prstGeom prst="rect">
+            <a:avLst/>
+          </a:prstGeom>
+        </p:spPr>
+      </p:pic>
+    </p:spTree>
+    <p:extLst>
+      <p:ext uri="{BB962C8B-B14F-4D97-AF65-F5344CB8AC3E}">
+        <p14:creationId xmlns:p14="http://schemas.microsoft.com/office/powerpoint/2010/main" val="963352615"/>
       </p:ext>
     </p:extLst>
   </p:cSld>

</xml_diff>

<commit_message>
modified:   .gitignore 	modified:   presentation.pptx
</commit_message>
<xml_diff>
--- a/presentation.pptx
+++ b/presentation.pptx
@@ -5,7 +5,7 @@
     <p:sldMasterId id="2147483648" r:id="rId1"/>
   </p:sldMasterIdLst>
   <p:notesMasterIdLst>
-    <p:notesMasterId r:id="rId10"/>
+    <p:notesMasterId r:id="rId11"/>
   </p:notesMasterIdLst>
   <p:sldIdLst>
     <p:sldId id="256" r:id="rId2"/>
@@ -14,8 +14,9 @@
     <p:sldId id="259" r:id="rId5"/>
     <p:sldId id="260" r:id="rId6"/>
     <p:sldId id="261" r:id="rId7"/>
-    <p:sldId id="262" r:id="rId8"/>
-    <p:sldId id="263" r:id="rId9"/>
+    <p:sldId id="264" r:id="rId8"/>
+    <p:sldId id="262" r:id="rId9"/>
+    <p:sldId id="263" r:id="rId10"/>
   </p:sldIdLst>
   <p:sldSz cx="12192000" cy="6858000"/>
   <p:notesSz cx="6858000" cy="9144000"/>
@@ -5399,6 +5400,235 @@
           <p:cNvPr id="2" name="タイトル 1">
             <a:extLst>
               <a:ext uri="{FF2B5EF4-FFF2-40B4-BE49-F238E27FC236}">
+                <a16:creationId xmlns:a16="http://schemas.microsoft.com/office/drawing/2014/main" id="{077FF7D8-910B-4005-BCEF-DB8D0F1350EA}"/>
+              </a:ext>
+            </a:extLst>
+          </p:cNvPr>
+          <p:cNvSpPr>
+            <a:spLocks noGrp="1"/>
+          </p:cNvSpPr>
+          <p:nvPr>
+            <p:ph type="title"/>
+          </p:nvPr>
+        </p:nvSpPr>
+        <p:spPr/>
+        <p:txBody>
+          <a:bodyPr/>
+          <a:lstStyle/>
+          <a:p>
+            <a:r>
+              <a:rPr lang="en-US" altLang="ja-JP" dirty="0"/>
+              <a:t>map</a:t>
+            </a:r>
+            <a:r>
+              <a:rPr lang="ja-JP" altLang="en-US" dirty="0"/>
+              <a:t>の構文</a:t>
+            </a:r>
+            <a:endParaRPr kumimoji="1" lang="ja-JP" altLang="en-US" dirty="0"/>
+          </a:p>
+        </p:txBody>
+      </p:sp>
+      <mc:AlternateContent xmlns:mc="http://schemas.openxmlformats.org/markup-compatibility/2006">
+        <mc:Choice xmlns:a14="http://schemas.microsoft.com/office/drawing/2010/main" Requires="a14">
+          <p:sp>
+            <p:nvSpPr>
+              <p:cNvPr id="3" name="コンテンツ プレースホルダー 2">
+                <a:extLst>
+                  <a:ext uri="{FF2B5EF4-FFF2-40B4-BE49-F238E27FC236}">
+                    <a16:creationId xmlns:a16="http://schemas.microsoft.com/office/drawing/2014/main" id="{86C44519-6084-4F24-A5C1-01A9641DA3D3}"/>
+                  </a:ext>
+                </a:extLst>
+              </p:cNvPr>
+              <p:cNvSpPr>
+                <a:spLocks noGrp="1"/>
+              </p:cNvSpPr>
+              <p:nvPr>
+                <p:ph idx="1"/>
+              </p:nvPr>
+            </p:nvSpPr>
+            <p:spPr/>
+            <p:txBody>
+              <a:bodyPr/>
+              <a:lstStyle/>
+              <a:p>
+                <a:pPr marL="0" indent="0">
+                  <a:buNone/>
+                </a:pPr>
+                <a14:m>
+                  <m:oMathPara xmlns:m="http://schemas.openxmlformats.org/officeDocument/2006/math">
+                    <m:oMathParaPr>
+                      <m:jc m:val="centerGroup"/>
+                    </m:oMathParaPr>
+                    <m:oMath xmlns:m="http://schemas.openxmlformats.org/officeDocument/2006/math">
+                      <m:r>
+                        <a:rPr kumimoji="1" lang="en-US" altLang="ja-JP" b="0" i="1" smtClean="0">
+                          <a:latin typeface="Cambria Math" panose="02040503050406030204" pitchFamily="18" charset="0"/>
+                        </a:rPr>
+                        <m:t>&lt;</m:t>
+                      </m:r>
+                      <m:r>
+                        <a:rPr kumimoji="1" lang="en-US" altLang="ja-JP" b="0" i="1" smtClean="0">
+                          <a:latin typeface="Cambria Math" panose="02040503050406030204" pitchFamily="18" charset="0"/>
+                        </a:rPr>
+                        <m:t>𝑚𝑎𝑧𝑒</m:t>
+                      </m:r>
+                      <m:r>
+                        <a:rPr kumimoji="1" lang="en-US" altLang="ja-JP" b="0" i="1" smtClean="0">
+                          <a:latin typeface="Cambria Math" panose="02040503050406030204" pitchFamily="18" charset="0"/>
+                        </a:rPr>
+                        <m:t>&gt;∷=′</m:t>
+                      </m:r>
+                      <m:r>
+                        <a:rPr kumimoji="1" lang="en-US" altLang="ja-JP" b="0" i="1" smtClean="0">
+                          <a:latin typeface="Cambria Math" panose="02040503050406030204" pitchFamily="18" charset="0"/>
+                        </a:rPr>
+                        <m:t>𝑋</m:t>
+                      </m:r>
+                      <m:r>
+                        <a:rPr kumimoji="1" lang="en-US" altLang="ja-JP" b="0" i="1" smtClean="0">
+                          <a:latin typeface="Cambria Math" panose="02040503050406030204" pitchFamily="18" charset="0"/>
+                        </a:rPr>
+                        <m:t>′</m:t>
+                      </m:r>
+                      <m:sSup>
+                        <m:sSupPr>
+                          <m:ctrlPr>
+                            <a:rPr kumimoji="1" lang="en-US" altLang="ja-JP" b="0" i="1" smtClean="0">
+                              <a:latin typeface="Cambria Math" panose="02040503050406030204" pitchFamily="18" charset="0"/>
+                            </a:rPr>
+                          </m:ctrlPr>
+                        </m:sSupPr>
+                        <m:e>
+                          <m:d>
+                            <m:dPr>
+                              <m:begChr m:val="|"/>
+                              <m:endChr m:val="|"/>
+                              <m:ctrlPr>
+                                <a:rPr kumimoji="1" lang="en-US" altLang="ja-JP" b="0" i="1" smtClean="0">
+                                  <a:latin typeface="Cambria Math" panose="02040503050406030204" pitchFamily="18" charset="0"/>
+                                </a:rPr>
+                              </m:ctrlPr>
+                            </m:dPr>
+                            <m:e>
+                              <m:r>
+                                <a:rPr kumimoji="1" lang="en-US" altLang="ja-JP" b="0" i="1" smtClean="0">
+                                  <a:latin typeface="Cambria Math" panose="02040503050406030204" pitchFamily="18" charset="0"/>
+                                </a:rPr>
+                                <m:t>′</m:t>
+                              </m:r>
+                              <m:r>
+                                <a:rPr kumimoji="1" lang="en-US" altLang="ja-JP" b="0" i="1" smtClean="0">
+                                  <a:latin typeface="Cambria Math" panose="02040503050406030204" pitchFamily="18" charset="0"/>
+                                </a:rPr>
+                                <m:t>𝑂</m:t>
+                              </m:r>
+                              <m:r>
+                                <a:rPr kumimoji="1" lang="en-US" altLang="ja-JP" b="0" i="1" smtClean="0">
+                                  <a:latin typeface="Cambria Math" panose="02040503050406030204" pitchFamily="18" charset="0"/>
+                                </a:rPr>
+                                <m:t>′</m:t>
+                              </m:r>
+                            </m:e>
+                          </m:d>
+                        </m:e>
+                        <m:sup>
+                          <m:r>
+                            <a:rPr kumimoji="1" lang="en-US" altLang="ja-JP" b="0" i="1" smtClean="0">
+                              <a:latin typeface="Cambria Math" panose="02040503050406030204" pitchFamily="18" charset="0"/>
+                            </a:rPr>
+                            <m:t>′</m:t>
+                          </m:r>
+                        </m:sup>
+                      </m:sSup>
+                      <m:r>
+                        <a:rPr kumimoji="1" lang="en-US" altLang="ja-JP" b="0" i="1" smtClean="0">
+                          <a:latin typeface="Cambria Math" panose="02040503050406030204" pitchFamily="18" charset="0"/>
+                        </a:rPr>
+                        <m:t>′</m:t>
+                      </m:r>
+                    </m:oMath>
+                  </m:oMathPara>
+                </a14:m>
+                <a:endParaRPr kumimoji="1" lang="ja-JP" altLang="en-US" dirty="0"/>
+              </a:p>
+            </p:txBody>
+          </p:sp>
+        </mc:Choice>
+        <mc:Fallback>
+          <p:sp>
+            <p:nvSpPr>
+              <p:cNvPr id="3" name="コンテンツ プレースホルダー 2">
+                <a:extLst>
+                  <a:ext uri="{FF2B5EF4-FFF2-40B4-BE49-F238E27FC236}">
+                    <a16:creationId xmlns:a16="http://schemas.microsoft.com/office/drawing/2014/main" id="{86C44519-6084-4F24-A5C1-01A9641DA3D3}"/>
+                  </a:ext>
+                </a:extLst>
+              </p:cNvPr>
+              <p:cNvSpPr>
+                <a:spLocks noGrp="1" noRot="1" noChangeAspect="1" noMove="1" noResize="1" noEditPoints="1" noAdjustHandles="1" noChangeArrowheads="1" noChangeShapeType="1" noTextEdit="1"/>
+              </p:cNvSpPr>
+              <p:nvPr>
+                <p:ph idx="1"/>
+              </p:nvPr>
+            </p:nvSpPr>
+            <p:spPr>
+              <a:blipFill>
+                <a:blip r:embed="rId2"/>
+                <a:stretch>
+                  <a:fillRect t="-140"/>
+                </a:stretch>
+              </a:blipFill>
+            </p:spPr>
+            <p:txBody>
+              <a:bodyPr/>
+              <a:lstStyle/>
+              <a:p>
+                <a:r>
+                  <a:rPr lang="ja-JP" altLang="en-US">
+                    <a:noFill/>
+                  </a:rPr>
+                  <a:t> </a:t>
+                </a:r>
+              </a:p>
+            </p:txBody>
+          </p:sp>
+        </mc:Fallback>
+      </mc:AlternateContent>
+    </p:spTree>
+    <p:extLst>
+      <p:ext uri="{BB962C8B-B14F-4D97-AF65-F5344CB8AC3E}">
+        <p14:creationId xmlns:p14="http://schemas.microsoft.com/office/powerpoint/2010/main" val="388713178"/>
+      </p:ext>
+    </p:extLst>
+  </p:cSld>
+  <p:clrMapOvr>
+    <a:masterClrMapping/>
+  </p:clrMapOvr>
+</p:sld>
+</file>
+
+<file path=ppt/slides/slide8.xml><?xml version="1.0" encoding="utf-8"?>
+<p:sld xmlns:a="http://schemas.openxmlformats.org/drawingml/2006/main" xmlns:r="http://schemas.openxmlformats.org/officeDocument/2006/relationships" xmlns:p="http://schemas.openxmlformats.org/presentationml/2006/main">
+  <p:cSld>
+    <p:spTree>
+      <p:nvGrpSpPr>
+        <p:cNvPr id="1" name=""/>
+        <p:cNvGrpSpPr/>
+        <p:nvPr/>
+      </p:nvGrpSpPr>
+      <p:grpSpPr>
+        <a:xfrm>
+          <a:off x="0" y="0"/>
+          <a:ext cx="0" cy="0"/>
+          <a:chOff x="0" y="0"/>
+          <a:chExt cx="0" cy="0"/>
+        </a:xfrm>
+      </p:grpSpPr>
+      <p:sp>
+        <p:nvSpPr>
+          <p:cNvPr id="2" name="タイトル 1">
+            <a:extLst>
+              <a:ext uri="{FF2B5EF4-FFF2-40B4-BE49-F238E27FC236}">
                 <a16:creationId xmlns:a16="http://schemas.microsoft.com/office/drawing/2014/main" id="{6E9334EE-5D45-44EF-82DF-FF97D2E64474}"/>
               </a:ext>
             </a:extLst>
@@ -5564,8 +5794,12 @@
               <a:t>’X’</a:t>
             </a:r>
             <a:r>
+              <a:rPr lang="ja-JP" altLang="en-US"/>
+              <a:t>にタテヨコで囲まれなければ</a:t>
+            </a:r>
+            <a:r>
               <a:rPr lang="ja-JP" altLang="en-US" dirty="0"/>
-              <a:t>に囲まれなければならない。</a:t>
+              <a:t>ならない。</a:t>
             </a:r>
             <a:endParaRPr kumimoji="1" lang="ja-JP" altLang="en-US" dirty="0"/>
           </a:p>
@@ -5584,7 +5818,7 @@
 </p:sld>
 </file>
 
-<file path=ppt/slides/slide8.xml><?xml version="1.0" encoding="utf-8"?>
+<file path=ppt/slides/slide9.xml><?xml version="1.0" encoding="utf-8"?>
 <p:sld xmlns:a="http://schemas.openxmlformats.org/drawingml/2006/main" xmlns:r="http://schemas.openxmlformats.org/officeDocument/2006/relationships" xmlns:p="http://schemas.openxmlformats.org/presentationml/2006/main">
   <p:cSld>
     <p:spTree>

</xml_diff>

<commit_message>
modified:   behavior.conf 	modified:   presentation.pptx
</commit_message>
<xml_diff>
--- a/presentation.pptx
+++ b/presentation.pptx
@@ -4762,8 +4762,8 @@
           </a:p>
         </p:txBody>
       </p:sp>
-      <mc:AlternateContent xmlns:mc="http://schemas.openxmlformats.org/markup-compatibility/2006">
-        <mc:Choice xmlns:a14="http://schemas.microsoft.com/office/drawing/2010/main" Requires="a14">
+      <mc:AlternateContent xmlns:mc="http://schemas.openxmlformats.org/markup-compatibility/2006" xmlns:a14="http://schemas.microsoft.com/office/drawing/2010/main">
+        <mc:Choice Requires="a14">
           <p:sp>
             <p:nvSpPr>
               <p:cNvPr id="3" name="コンテンツ プレースホルダー 2">
@@ -5488,7 +5488,7 @@
             </p:txBody>
           </p:sp>
         </mc:Choice>
-        <mc:Fallback>
+        <mc:Fallback xmlns="">
           <p:sp>
             <p:nvSpPr>
               <p:cNvPr id="3" name="コンテンツ プレースホルダー 2">
@@ -6185,8 +6185,8 @@
           </a:p>
         </p:txBody>
       </p:sp>
-      <mc:AlternateContent xmlns:mc="http://schemas.openxmlformats.org/markup-compatibility/2006" xmlns:a14="http://schemas.microsoft.com/office/drawing/2010/main">
-        <mc:Choice Requires="a14">
+      <mc:AlternateContent xmlns:mc="http://schemas.openxmlformats.org/markup-compatibility/2006">
+        <mc:Choice xmlns:a14="http://schemas.microsoft.com/office/drawing/2010/main" Requires="a14">
           <p:sp>
             <p:nvSpPr>
               <p:cNvPr id="3" name="コンテンツ プレースホルダー 2">
@@ -6218,16 +6218,16 @@
                     </m:oMathParaPr>
                     <m:oMath xmlns:m="http://schemas.openxmlformats.org/officeDocument/2006/math">
                       <m:r>
-                        <a:rPr kumimoji="1" lang="en-US" altLang="ja-JP" b="0" i="1" smtClean="0">
+                        <a:rPr lang="en-US" altLang="ja-JP" i="1" smtClean="0">
                           <a:latin typeface="Cambria Math" panose="02040503050406030204" pitchFamily="18" charset="0"/>
                         </a:rPr>
                         <m:t>&lt;</m:t>
                       </m:r>
                       <m:r>
-                        <a:rPr kumimoji="1" lang="en-US" altLang="ja-JP" b="0" i="1" smtClean="0">
-                          <a:latin typeface="Cambria Math" panose="02040503050406030204" pitchFamily="18" charset="0"/>
-                        </a:rPr>
-                        <m:t>𝑚𝑎𝑧𝑒</m:t>
+                        <a:rPr lang="en-US" altLang="ja-JP" b="0" i="1" smtClean="0">
+                          <a:latin typeface="Cambria Math" panose="02040503050406030204" pitchFamily="18" charset="0"/>
+                        </a:rPr>
+                        <m:t>𝑚𝑎𝑝</m:t>
                       </m:r>
                       <m:r>
                         <a:rPr kumimoji="1" lang="en-US" altLang="ja-JP" b="0" i="1" smtClean="0">
@@ -6630,7 +6630,7 @@
             </p:txBody>
           </p:sp>
         </mc:Choice>
-        <mc:Fallback xmlns="">
+        <mc:Fallback>
           <p:sp>
             <p:nvSpPr>
               <p:cNvPr id="3" name="コンテンツ プレースホルダー 2">

</xml_diff>

<commit_message>
modified:   presentation.pptx 	new file:   raycasting.drawio 	new file:   raycasting.png
</commit_message>
<xml_diff>
--- a/presentation.pptx
+++ b/presentation.pptx
@@ -5,7 +5,7 @@
     <p:sldMasterId id="2147483660" r:id="rId1"/>
   </p:sldMasterIdLst>
   <p:notesMasterIdLst>
-    <p:notesMasterId r:id="rId13"/>
+    <p:notesMasterId r:id="rId14"/>
   </p:notesMasterIdLst>
   <p:sldIdLst>
     <p:sldId id="256" r:id="rId2"/>
@@ -18,7 +18,8 @@
     <p:sldId id="260" r:id="rId9"/>
     <p:sldId id="264" r:id="rId10"/>
     <p:sldId id="262" r:id="rId11"/>
-    <p:sldId id="266" r:id="rId12"/>
+    <p:sldId id="267" r:id="rId12"/>
+    <p:sldId id="266" r:id="rId13"/>
   </p:sldIdLst>
   <p:sldSz cx="12192000" cy="6858000"/>
   <p:notesSz cx="6858000" cy="9144000"/>
@@ -207,7 +208,7 @@
           <a:p>
             <a:fld id="{DACD13BE-CFF8-4274-8F33-E17667936FF0}" type="datetimeFigureOut">
               <a:rPr kumimoji="1" lang="ja-JP" altLang="en-US" smtClean="0"/>
-              <a:t>2021/5/8</a:t>
+              <a:t>2021/5/10</a:t>
             </a:fld>
             <a:endParaRPr kumimoji="1" lang="ja-JP" altLang="en-US"/>
           </a:p>
@@ -581,6 +582,90 @@
     <p:extLst>
       <p:ext uri="{BB962C8B-B14F-4D97-AF65-F5344CB8AC3E}">
         <p14:creationId xmlns:p14="http://schemas.microsoft.com/office/powerpoint/2010/main" val="1837503596"/>
+      </p:ext>
+    </p:extLst>
+  </p:cSld>
+  <p:clrMapOvr>
+    <a:masterClrMapping/>
+  </p:clrMapOvr>
+</p:notes>
+</file>
+
+<file path=ppt/notesSlides/notesSlide2.xml><?xml version="1.0" encoding="utf-8"?>
+<p:notes xmlns:a="http://schemas.openxmlformats.org/drawingml/2006/main" xmlns:r="http://schemas.openxmlformats.org/officeDocument/2006/relationships" xmlns:p="http://schemas.openxmlformats.org/presentationml/2006/main">
+  <p:cSld>
+    <p:spTree>
+      <p:nvGrpSpPr>
+        <p:cNvPr id="1" name=""/>
+        <p:cNvGrpSpPr/>
+        <p:nvPr/>
+      </p:nvGrpSpPr>
+      <p:grpSpPr>
+        <a:xfrm>
+          <a:off x="0" y="0"/>
+          <a:ext cx="0" cy="0"/>
+          <a:chOff x="0" y="0"/>
+          <a:chExt cx="0" cy="0"/>
+        </a:xfrm>
+      </p:grpSpPr>
+      <p:sp>
+        <p:nvSpPr>
+          <p:cNvPr id="2" name="スライド イメージ プレースホルダー 1"/>
+          <p:cNvSpPr>
+            <a:spLocks noGrp="1" noRot="1" noChangeAspect="1"/>
+          </p:cNvSpPr>
+          <p:nvPr>
+            <p:ph type="sldImg"/>
+          </p:nvPr>
+        </p:nvSpPr>
+        <p:spPr/>
+      </p:sp>
+      <p:sp>
+        <p:nvSpPr>
+          <p:cNvPr id="3" name="ノート プレースホルダー 2"/>
+          <p:cNvSpPr>
+            <a:spLocks noGrp="1"/>
+          </p:cNvSpPr>
+          <p:nvPr>
+            <p:ph type="body" idx="1"/>
+          </p:nvPr>
+        </p:nvSpPr>
+        <p:spPr/>
+        <p:txBody>
+          <a:bodyPr/>
+          <a:lstStyle/>
+          <a:p>
+            <a:endParaRPr kumimoji="1" lang="ja-JP" altLang="en-US" dirty="0"/>
+          </a:p>
+        </p:txBody>
+      </p:sp>
+      <p:sp>
+        <p:nvSpPr>
+          <p:cNvPr id="4" name="スライド番号プレースホルダー 3"/>
+          <p:cNvSpPr>
+            <a:spLocks noGrp="1"/>
+          </p:cNvSpPr>
+          <p:nvPr>
+            <p:ph type="sldNum" sz="quarter" idx="5"/>
+          </p:nvPr>
+        </p:nvSpPr>
+        <p:spPr/>
+        <p:txBody>
+          <a:bodyPr/>
+          <a:lstStyle/>
+          <a:p>
+            <a:fld id="{5A21C2A0-4F37-4755-A7D4-6161E960034A}" type="slidenum">
+              <a:rPr kumimoji="1" lang="ja-JP" altLang="en-US" smtClean="0"/>
+              <a:t>11</a:t>
+            </a:fld>
+            <a:endParaRPr kumimoji="1" lang="ja-JP" altLang="en-US"/>
+          </a:p>
+        </p:txBody>
+      </p:sp>
+    </p:spTree>
+    <p:extLst>
+      <p:ext uri="{BB962C8B-B14F-4D97-AF65-F5344CB8AC3E}">
+        <p14:creationId xmlns:p14="http://schemas.microsoft.com/office/powerpoint/2010/main" val="158237264"/>
       </p:ext>
     </p:extLst>
   </p:cSld>
@@ -1312,7 +1397,7 @@
           <a:p>
             <a:fld id="{2D3307F4-2003-445F-80EA-0A6F700AA6C1}" type="datetimeFigureOut">
               <a:rPr kumimoji="1" lang="ja-JP" altLang="en-US" smtClean="0"/>
-              <a:t>2021/5/8</a:t>
+              <a:t>2021/5/10</a:t>
             </a:fld>
             <a:endParaRPr kumimoji="1" lang="ja-JP" altLang="en-US"/>
           </a:p>
@@ -1563,7 +1648,7 @@
           <a:p>
             <a:fld id="{2D3307F4-2003-445F-80EA-0A6F700AA6C1}" type="datetimeFigureOut">
               <a:rPr kumimoji="1" lang="ja-JP" altLang="en-US" smtClean="0"/>
-              <a:t>2021/5/8</a:t>
+              <a:t>2021/5/10</a:t>
             </a:fld>
             <a:endParaRPr kumimoji="1" lang="ja-JP" altLang="en-US"/>
           </a:p>
@@ -1877,7 +1962,7 @@
           <a:p>
             <a:fld id="{2D3307F4-2003-445F-80EA-0A6F700AA6C1}" type="datetimeFigureOut">
               <a:rPr kumimoji="1" lang="ja-JP" altLang="en-US" smtClean="0"/>
-              <a:t>2021/5/8</a:t>
+              <a:t>2021/5/10</a:t>
             </a:fld>
             <a:endParaRPr kumimoji="1" lang="ja-JP" altLang="en-US"/>
           </a:p>
@@ -2218,7 +2303,7 @@
           <a:p>
             <a:fld id="{2D3307F4-2003-445F-80EA-0A6F700AA6C1}" type="datetimeFigureOut">
               <a:rPr kumimoji="1" lang="ja-JP" altLang="en-US" smtClean="0"/>
-              <a:t>2021/5/8</a:t>
+              <a:t>2021/5/10</a:t>
             </a:fld>
             <a:endParaRPr kumimoji="1" lang="ja-JP" altLang="en-US"/>
           </a:p>
@@ -2532,7 +2617,7 @@
           <a:p>
             <a:fld id="{2D3307F4-2003-445F-80EA-0A6F700AA6C1}" type="datetimeFigureOut">
               <a:rPr kumimoji="1" lang="ja-JP" altLang="en-US" smtClean="0"/>
-              <a:t>2021/5/8</a:t>
+              <a:t>2021/5/10</a:t>
             </a:fld>
             <a:endParaRPr kumimoji="1" lang="ja-JP" altLang="en-US"/>
           </a:p>
@@ -2925,7 +3010,7 @@
           <a:p>
             <a:fld id="{2D3307F4-2003-445F-80EA-0A6F700AA6C1}" type="datetimeFigureOut">
               <a:rPr kumimoji="1" lang="ja-JP" altLang="en-US" smtClean="0"/>
-              <a:t>2021/5/8</a:t>
+              <a:t>2021/5/10</a:t>
             </a:fld>
             <a:endParaRPr kumimoji="1" lang="ja-JP" altLang="en-US"/>
           </a:p>
@@ -3127,7 +3212,7 @@
           <a:p>
             <a:fld id="{2D3307F4-2003-445F-80EA-0A6F700AA6C1}" type="datetimeFigureOut">
               <a:rPr kumimoji="1" lang="ja-JP" altLang="en-US" smtClean="0"/>
-              <a:t>2021/5/8</a:t>
+              <a:t>2021/5/10</a:t>
             </a:fld>
             <a:endParaRPr kumimoji="1" lang="ja-JP" altLang="en-US"/>
           </a:p>
@@ -3339,7 +3424,7 @@
           <a:p>
             <a:fld id="{2D3307F4-2003-445F-80EA-0A6F700AA6C1}" type="datetimeFigureOut">
               <a:rPr kumimoji="1" lang="ja-JP" altLang="en-US" smtClean="0"/>
-              <a:t>2021/5/8</a:t>
+              <a:t>2021/5/10</a:t>
             </a:fld>
             <a:endParaRPr kumimoji="1" lang="ja-JP" altLang="en-US"/>
           </a:p>
@@ -3547,7 +3632,7 @@
           <a:p>
             <a:fld id="{2D3307F4-2003-445F-80EA-0A6F700AA6C1}" type="datetimeFigureOut">
               <a:rPr kumimoji="1" lang="ja-JP" altLang="en-US" smtClean="0"/>
-              <a:t>2021/5/8</a:t>
+              <a:t>2021/5/10</a:t>
             </a:fld>
             <a:endParaRPr kumimoji="1" lang="ja-JP" altLang="en-US"/>
           </a:p>
@@ -3794,7 +3879,7 @@
           <a:p>
             <a:fld id="{2D3307F4-2003-445F-80EA-0A6F700AA6C1}" type="datetimeFigureOut">
               <a:rPr kumimoji="1" lang="ja-JP" altLang="en-US" smtClean="0"/>
-              <a:t>2021/5/8</a:t>
+              <a:t>2021/5/10</a:t>
             </a:fld>
             <a:endParaRPr kumimoji="1" lang="ja-JP" altLang="en-US"/>
           </a:p>
@@ -4090,7 +4175,7 @@
           <a:p>
             <a:fld id="{2D3307F4-2003-445F-80EA-0A6F700AA6C1}" type="datetimeFigureOut">
               <a:rPr kumimoji="1" lang="ja-JP" altLang="en-US" smtClean="0"/>
-              <a:t>2021/5/8</a:t>
+              <a:t>2021/5/10</a:t>
             </a:fld>
             <a:endParaRPr kumimoji="1" lang="ja-JP" altLang="en-US"/>
           </a:p>
@@ -4528,7 +4613,7 @@
           <a:p>
             <a:fld id="{2D3307F4-2003-445F-80EA-0A6F700AA6C1}" type="datetimeFigureOut">
               <a:rPr kumimoji="1" lang="ja-JP" altLang="en-US" smtClean="0"/>
-              <a:t>2021/5/8</a:t>
+              <a:t>2021/5/10</a:t>
             </a:fld>
             <a:endParaRPr kumimoji="1" lang="ja-JP" altLang="en-US"/>
           </a:p>
@@ -4651,7 +4736,7 @@
           <a:p>
             <a:fld id="{2D3307F4-2003-445F-80EA-0A6F700AA6C1}" type="datetimeFigureOut">
               <a:rPr kumimoji="1" lang="ja-JP" altLang="en-US" smtClean="0"/>
-              <a:t>2021/5/8</a:t>
+              <a:t>2021/5/10</a:t>
             </a:fld>
             <a:endParaRPr kumimoji="1" lang="ja-JP" altLang="en-US"/>
           </a:p>
@@ -4746,7 +4831,7 @@
           <a:p>
             <a:fld id="{2D3307F4-2003-445F-80EA-0A6F700AA6C1}" type="datetimeFigureOut">
               <a:rPr kumimoji="1" lang="ja-JP" altLang="en-US" smtClean="0"/>
-              <a:t>2021/5/8</a:t>
+              <a:t>2021/5/10</a:t>
             </a:fld>
             <a:endParaRPr kumimoji="1" lang="ja-JP" altLang="en-US"/>
           </a:p>
@@ -5033,7 +5118,7 @@
           <a:p>
             <a:fld id="{2D3307F4-2003-445F-80EA-0A6F700AA6C1}" type="datetimeFigureOut">
               <a:rPr kumimoji="1" lang="ja-JP" altLang="en-US" smtClean="0"/>
-              <a:t>2021/5/8</a:t>
+              <a:t>2021/5/10</a:t>
             </a:fld>
             <a:endParaRPr kumimoji="1" lang="ja-JP" altLang="en-US"/>
           </a:p>
@@ -5296,7 +5381,7 @@
           <a:p>
             <a:fld id="{2D3307F4-2003-445F-80EA-0A6F700AA6C1}" type="datetimeFigureOut">
               <a:rPr kumimoji="1" lang="ja-JP" altLang="en-US" smtClean="0"/>
-              <a:t>2021/5/8</a:t>
+              <a:t>2021/5/10</a:t>
             </a:fld>
             <a:endParaRPr kumimoji="1" lang="ja-JP" altLang="en-US"/>
           </a:p>
@@ -6071,7 +6156,7 @@
           <a:p>
             <a:fld id="{2D3307F4-2003-445F-80EA-0A6F700AA6C1}" type="datetimeFigureOut">
               <a:rPr kumimoji="1" lang="ja-JP" altLang="en-US" smtClean="0"/>
-              <a:t>2021/5/8</a:t>
+              <a:t>2021/5/10</a:t>
             </a:fld>
             <a:endParaRPr kumimoji="1" lang="ja-JP" altLang="en-US"/>
           </a:p>
@@ -6611,19 +6696,25 @@
             <p:ph type="ctrTitle"/>
           </p:nvPr>
         </p:nvSpPr>
-        <p:spPr/>
+        <p:spPr>
+          <a:xfrm>
+            <a:off x="1507067" y="2404531"/>
+            <a:ext cx="7766936" cy="1646302"/>
+          </a:xfrm>
+        </p:spPr>
         <p:txBody>
           <a:bodyPr/>
           <a:lstStyle/>
           <a:p>
             <a:r>
               <a:rPr lang="en-US" altLang="ja-JP" dirty="0"/>
-              <a:t>3D</a:t>
-            </a:r>
-            <a:r>
-              <a:rPr kumimoji="1" lang="ja-JP" altLang="en-US" dirty="0"/>
-              <a:t>スクリーンセーバー</a:t>
-            </a:r>
+              <a:t>3D </a:t>
+            </a:r>
+            <a:r>
+              <a:rPr lang="en-US" altLang="ja-JP" dirty="0" err="1"/>
+              <a:t>ScreenSaver</a:t>
+            </a:r>
+            <a:endParaRPr kumimoji="1" lang="ja-JP" altLang="en-US" dirty="0"/>
           </a:p>
         </p:txBody>
       </p:sp>
@@ -6788,7 +6879,23 @@
             </a:r>
             <a:r>
               <a:rPr lang="ja-JP" altLang="en-US" dirty="0"/>
-              <a:t>のいずれかで、</a:t>
+              <a:t>のいずれか</a:t>
+            </a:r>
+            <a:r>
+              <a:rPr lang="en-US" altLang="ja-JP" dirty="0"/>
+              <a:t>(</a:t>
+            </a:r>
+            <a:r>
+              <a:rPr lang="ja-JP" altLang="en-US" dirty="0"/>
+              <a:t>東西南北に対応</a:t>
+            </a:r>
+            <a:r>
+              <a:rPr lang="en-US" altLang="ja-JP" dirty="0"/>
+              <a:t>)</a:t>
+            </a:r>
+            <a:r>
+              <a:rPr lang="ja-JP" altLang="en-US" dirty="0"/>
+              <a:t>で、</a:t>
             </a:r>
             <a:r>
               <a:rPr lang="en-US" altLang="ja-JP" dirty="0"/>
@@ -6891,12 +6998,8 @@
               <a:t>’X’</a:t>
             </a:r>
             <a:r>
-              <a:rPr lang="ja-JP" altLang="en-US"/>
-              <a:t>にタテヨコで囲まれなければ</a:t>
-            </a:r>
-            <a:r>
               <a:rPr lang="ja-JP" altLang="en-US" dirty="0"/>
-              <a:t>ならない。</a:t>
+              <a:t>にタテヨコで囲まれなければならない。</a:t>
             </a:r>
             <a:endParaRPr kumimoji="1" lang="ja-JP" altLang="en-US" dirty="0"/>
           </a:p>
@@ -6937,6 +7040,248 @@
           <p:cNvPr id="2" name="タイトル 1">
             <a:extLst>
               <a:ext uri="{FF2B5EF4-FFF2-40B4-BE49-F238E27FC236}">
+                <a16:creationId xmlns:a16="http://schemas.microsoft.com/office/drawing/2014/main" id="{99AA5D3A-3364-410C-B6DF-6AB69A7850DF}"/>
+              </a:ext>
+            </a:extLst>
+          </p:cNvPr>
+          <p:cNvSpPr>
+            <a:spLocks noGrp="1"/>
+          </p:cNvSpPr>
+          <p:nvPr>
+            <p:ph type="title"/>
+          </p:nvPr>
+        </p:nvSpPr>
+        <p:spPr/>
+        <p:txBody>
+          <a:bodyPr/>
+          <a:lstStyle/>
+          <a:p>
+            <a:r>
+              <a:rPr kumimoji="1" lang="ja-JP" altLang="en-US" dirty="0"/>
+              <a:t>レイキャスティングのコンセプト</a:t>
+            </a:r>
+          </a:p>
+        </p:txBody>
+      </p:sp>
+      <p:sp>
+        <p:nvSpPr>
+          <p:cNvPr id="3" name="コンテンツ プレースホルダー 2">
+            <a:extLst>
+              <a:ext uri="{FF2B5EF4-FFF2-40B4-BE49-F238E27FC236}">
+                <a16:creationId xmlns:a16="http://schemas.microsoft.com/office/drawing/2014/main" id="{987EDCC6-3E99-491D-B7F7-431CD722A0E7}"/>
+              </a:ext>
+            </a:extLst>
+          </p:cNvPr>
+          <p:cNvSpPr>
+            <a:spLocks noGrp="1"/>
+          </p:cNvSpPr>
+          <p:nvPr>
+            <p:ph idx="1"/>
+          </p:nvPr>
+        </p:nvSpPr>
+        <p:spPr/>
+        <p:txBody>
+          <a:bodyPr/>
+          <a:lstStyle/>
+          <a:p>
+            <a:r>
+              <a:rPr lang="ja-JP" altLang="en-US" dirty="0"/>
+              <a:t>ある場所から視野角内に光線を飛ばし、物体との距離を測る</a:t>
+            </a:r>
+            <a:endParaRPr lang="en-US" altLang="ja-JP" dirty="0"/>
+          </a:p>
+          <a:p>
+            <a:r>
+              <a:rPr lang="ja-JP" altLang="en-US" dirty="0"/>
+              <a:t>検出した物体をカメラ平面との距離に応じたサイズで描画する</a:t>
+            </a:r>
+            <a:endParaRPr lang="en-US" altLang="ja-JP" dirty="0"/>
+          </a:p>
+          <a:p>
+            <a:r>
+              <a:rPr lang="ja-JP" altLang="en-US" dirty="0"/>
+              <a:t>光線はディスプレイの横のピクセルの個数分飛ばす</a:t>
+            </a:r>
+            <a:endParaRPr lang="en-US" altLang="ja-JP" dirty="0"/>
+          </a:p>
+          <a:p>
+            <a:r>
+              <a:rPr kumimoji="1" lang="ja-JP" altLang="en-US" dirty="0"/>
+              <a:t>カメラ平面と障害物との距離が大きいほど障害物を小さく描画する</a:t>
+            </a:r>
+            <a:endParaRPr lang="en-US" altLang="ja-JP" dirty="0"/>
+          </a:p>
+          <a:p>
+            <a:pPr marL="0" indent="0">
+              <a:buNone/>
+            </a:pPr>
+            <a:endParaRPr kumimoji="1" lang="ja-JP" altLang="en-US" dirty="0"/>
+          </a:p>
+        </p:txBody>
+      </p:sp>
+      <p:sp>
+        <p:nvSpPr>
+          <p:cNvPr id="6" name="テキスト ボックス 5">
+            <a:extLst>
+              <a:ext uri="{FF2B5EF4-FFF2-40B4-BE49-F238E27FC236}">
+                <a16:creationId xmlns:a16="http://schemas.microsoft.com/office/drawing/2014/main" id="{C2E8A5F2-1A83-426A-8A42-B51EB15E414E}"/>
+              </a:ext>
+            </a:extLst>
+          </p:cNvPr>
+          <p:cNvSpPr txBox="1"/>
+          <p:nvPr/>
+        </p:nvSpPr>
+        <p:spPr>
+          <a:xfrm>
+            <a:off x="4975668" y="4319688"/>
+            <a:ext cx="4798108" cy="1200329"/>
+          </a:xfrm>
+          <a:prstGeom prst="rect">
+            <a:avLst/>
+          </a:prstGeom>
+          <a:noFill/>
+        </p:spPr>
+        <p:txBody>
+          <a:bodyPr wrap="none" rtlCol="0">
+            <a:spAutoFit/>
+          </a:bodyPr>
+          <a:lstStyle/>
+          <a:p>
+            <a:pPr marL="285750" indent="-285750">
+              <a:buFont typeface="Arial" panose="020B0604020202020204" pitchFamily="34" charset="0"/>
+              <a:buChar char="•"/>
+            </a:pPr>
+            <a:r>
+              <a:rPr kumimoji="1" lang="ja-JP" altLang="en-US" dirty="0"/>
+              <a:t>青矢印が光線</a:t>
+            </a:r>
+            <a:endParaRPr kumimoji="1" lang="en-US" altLang="ja-JP" dirty="0"/>
+          </a:p>
+          <a:p>
+            <a:pPr marL="285750" indent="-285750">
+              <a:buFont typeface="Arial" panose="020B0604020202020204" pitchFamily="34" charset="0"/>
+              <a:buChar char="•"/>
+            </a:pPr>
+            <a:r>
+              <a:rPr kumimoji="1" lang="ja-JP" altLang="en-US" dirty="0"/>
+              <a:t>破線がカメラ平面</a:t>
+            </a:r>
+            <a:r>
+              <a:rPr kumimoji="1" lang="en-US" altLang="ja-JP" dirty="0"/>
+              <a:t>(</a:t>
+            </a:r>
+            <a:r>
+              <a:rPr kumimoji="1" lang="ja-JP" altLang="en-US" dirty="0"/>
+              <a:t>向いている方向と垂直</a:t>
+            </a:r>
+            <a:r>
+              <a:rPr kumimoji="1" lang="en-US" altLang="ja-JP" dirty="0"/>
+              <a:t>)</a:t>
+            </a:r>
+          </a:p>
+          <a:p>
+            <a:pPr marL="285750" indent="-285750">
+              <a:buFont typeface="Arial" panose="020B0604020202020204" pitchFamily="34" charset="0"/>
+              <a:buChar char="•"/>
+            </a:pPr>
+            <a:r>
+              <a:rPr kumimoji="1" lang="ja-JP" altLang="en-US" dirty="0"/>
+              <a:t>赤線がカメラ平面と障害物との距離</a:t>
+            </a:r>
+            <a:endParaRPr kumimoji="1" lang="en-US" altLang="ja-JP" dirty="0"/>
+          </a:p>
+          <a:p>
+            <a:r>
+              <a:rPr kumimoji="1" lang="ja-JP" altLang="en-US" dirty="0"/>
+              <a:t>　</a:t>
+            </a:r>
+            <a:r>
+              <a:rPr kumimoji="1" lang="en-US" altLang="ja-JP" dirty="0"/>
+              <a:t>(</a:t>
+            </a:r>
+            <a:r>
+              <a:rPr kumimoji="1" lang="ja-JP" altLang="en-US" dirty="0"/>
+              <a:t>描画で使う距離</a:t>
+            </a:r>
+            <a:r>
+              <a:rPr kumimoji="1" lang="en-US" altLang="ja-JP" dirty="0"/>
+              <a:t>)</a:t>
+            </a:r>
+            <a:endParaRPr kumimoji="1" lang="ja-JP" altLang="en-US" dirty="0"/>
+          </a:p>
+        </p:txBody>
+      </p:sp>
+      <p:pic>
+        <p:nvPicPr>
+          <p:cNvPr id="10" name="図 9">
+            <a:extLst>
+              <a:ext uri="{FF2B5EF4-FFF2-40B4-BE49-F238E27FC236}">
+                <a16:creationId xmlns:a16="http://schemas.microsoft.com/office/drawing/2014/main" id="{52AC5330-39D5-4DC0-B1E8-D12614557888}"/>
+              </a:ext>
+            </a:extLst>
+          </p:cNvPr>
+          <p:cNvPicPr>
+            <a:picLocks noChangeAspect="1"/>
+          </p:cNvPicPr>
+          <p:nvPr/>
+        </p:nvPicPr>
+        <p:blipFill>
+          <a:blip r:embed="rId3">
+            <a:extLst>
+              <a:ext uri="{28A0092B-C50C-407E-A947-70E740481C1C}">
+                <a14:useLocalDpi xmlns:a14="http://schemas.microsoft.com/office/drawing/2010/main" val="0"/>
+              </a:ext>
+            </a:extLst>
+          </a:blip>
+          <a:stretch>
+            <a:fillRect/>
+          </a:stretch>
+        </p:blipFill>
+        <p:spPr>
+          <a:xfrm>
+            <a:off x="1146618" y="3728800"/>
+            <a:ext cx="3829050" cy="2495550"/>
+          </a:xfrm>
+          <a:prstGeom prst="rect">
+            <a:avLst/>
+          </a:prstGeom>
+        </p:spPr>
+      </p:pic>
+    </p:spTree>
+    <p:extLst>
+      <p:ext uri="{BB962C8B-B14F-4D97-AF65-F5344CB8AC3E}">
+        <p14:creationId xmlns:p14="http://schemas.microsoft.com/office/powerpoint/2010/main" val="1533209314"/>
+      </p:ext>
+    </p:extLst>
+  </p:cSld>
+  <p:clrMapOvr>
+    <a:masterClrMapping/>
+  </p:clrMapOvr>
+</p:sld>
+</file>
+
+<file path=ppt/slides/slide12.xml><?xml version="1.0" encoding="utf-8"?>
+<p:sld xmlns:a="http://schemas.openxmlformats.org/drawingml/2006/main" xmlns:r="http://schemas.openxmlformats.org/officeDocument/2006/relationships" xmlns:p="http://schemas.openxmlformats.org/presentationml/2006/main">
+  <p:cSld>
+    <p:spTree>
+      <p:nvGrpSpPr>
+        <p:cNvPr id="1" name=""/>
+        <p:cNvGrpSpPr/>
+        <p:nvPr/>
+      </p:nvGrpSpPr>
+      <p:grpSpPr>
+        <a:xfrm>
+          <a:off x="0" y="0"/>
+          <a:ext cx="0" cy="0"/>
+          <a:chOff x="0" y="0"/>
+          <a:chExt cx="0" cy="0"/>
+        </a:xfrm>
+      </p:grpSpPr>
+      <p:sp>
+        <p:nvSpPr>
+          <p:cNvPr id="2" name="タイトル 1">
+            <a:extLst>
+              <a:ext uri="{FF2B5EF4-FFF2-40B4-BE49-F238E27FC236}">
                 <a16:creationId xmlns:a16="http://schemas.microsoft.com/office/drawing/2014/main" id="{33B7FC01-E128-4690-B776-F5AC32578BF3}"/>
               </a:ext>
             </a:extLst>
@@ -6955,7 +7300,7 @@
           <a:p>
             <a:r>
               <a:rPr kumimoji="1" lang="ja-JP" altLang="en-US" dirty="0"/>
-              <a:t>詳細</a:t>
+              <a:t>その他</a:t>
             </a:r>
           </a:p>
         </p:txBody>
@@ -6985,28 +7330,8 @@
               <a:buNone/>
             </a:pPr>
             <a:r>
-              <a:rPr kumimoji="1" lang="en-US" altLang="ja-JP" dirty="0"/>
-              <a:t>4</a:t>
-            </a:r>
-            <a:r>
               <a:rPr kumimoji="1" lang="ja-JP" altLang="en-US" dirty="0"/>
-              <a:t>分間にまとめられなさそうなものをまとめました。</a:t>
-            </a:r>
-            <a:r>
-              <a:rPr kumimoji="1" lang="en-US" altLang="ja-JP" dirty="0"/>
-              <a:t>2~4</a:t>
-            </a:r>
-            <a:r>
-              <a:rPr kumimoji="1" lang="ja-JP" altLang="en-US" dirty="0"/>
-              <a:t>ページの</a:t>
-            </a:r>
-            <a:r>
-              <a:rPr kumimoji="1" lang="en-US" altLang="ja-JP" dirty="0"/>
-              <a:t>QR</a:t>
-            </a:r>
-            <a:r>
-              <a:rPr kumimoji="1" lang="ja-JP" altLang="en-US" dirty="0"/>
-              <a:t>コードと同じリンクです。</a:t>
+              <a:t>リポジトリ</a:t>
             </a:r>
             <a:endParaRPr kumimoji="1" lang="en-US" altLang="ja-JP" dirty="0"/>
           </a:p>
@@ -7117,146 +7442,6 @@
           </a:xfrm>
         </p:spPr>
       </p:pic>
-      <p:grpSp>
-        <p:nvGrpSpPr>
-          <p:cNvPr id="7" name="グループ化 6">
-            <a:extLst>
-              <a:ext uri="{FF2B5EF4-FFF2-40B4-BE49-F238E27FC236}">
-                <a16:creationId xmlns:a16="http://schemas.microsoft.com/office/drawing/2014/main" id="{F3D19176-E855-4E72-838E-5808A214870E}"/>
-              </a:ext>
-            </a:extLst>
-          </p:cNvPr>
-          <p:cNvGrpSpPr/>
-          <p:nvPr/>
-        </p:nvGrpSpPr>
-        <p:grpSpPr>
-          <a:xfrm>
-            <a:off x="9099035" y="2619513"/>
-            <a:ext cx="2063692" cy="2315362"/>
-            <a:chOff x="9764785" y="2550253"/>
-            <a:chExt cx="2063692" cy="2315362"/>
-          </a:xfrm>
-        </p:grpSpPr>
-        <p:sp>
-          <p:nvSpPr>
-            <p:cNvPr id="3" name="正方形/長方形 2">
-              <a:extLst>
-                <a:ext uri="{FF2B5EF4-FFF2-40B4-BE49-F238E27FC236}">
-                  <a16:creationId xmlns:a16="http://schemas.microsoft.com/office/drawing/2014/main" id="{6D4E7D9C-A10C-4E1D-AF77-5B259296744F}"/>
-                </a:ext>
-              </a:extLst>
-            </p:cNvPr>
-            <p:cNvSpPr/>
-            <p:nvPr/>
-          </p:nvSpPr>
-          <p:spPr>
-            <a:xfrm>
-              <a:off x="9764785" y="2550253"/>
-              <a:ext cx="2063692" cy="2315362"/>
-            </a:xfrm>
-            <a:prstGeom prst="rect">
-              <a:avLst/>
-            </a:prstGeom>
-            <a:noFill/>
-          </p:spPr>
-          <p:style>
-            <a:lnRef idx="2">
-              <a:schemeClr val="accent1">
-                <a:shade val="50000"/>
-              </a:schemeClr>
-            </a:lnRef>
-            <a:fillRef idx="1">
-              <a:schemeClr val="accent1"/>
-            </a:fillRef>
-            <a:effectRef idx="0">
-              <a:schemeClr val="accent1"/>
-            </a:effectRef>
-            <a:fontRef idx="minor">
-              <a:schemeClr val="lt1"/>
-            </a:fontRef>
-          </p:style>
-          <p:txBody>
-            <a:bodyPr rtlCol="0" anchor="ctr"/>
-            <a:lstStyle/>
-            <a:p>
-              <a:pPr algn="ctr"/>
-              <a:endParaRPr kumimoji="1" lang="ja-JP" altLang="en-US"/>
-            </a:p>
-          </p:txBody>
-        </p:sp>
-        <p:pic>
-          <p:nvPicPr>
-            <p:cNvPr id="6" name="コンテンツ プレースホルダー 9">
-              <a:extLst>
-                <a:ext uri="{FF2B5EF4-FFF2-40B4-BE49-F238E27FC236}">
-                  <a16:creationId xmlns:a16="http://schemas.microsoft.com/office/drawing/2014/main" id="{3FD5F279-75B0-4880-9C78-5F2C8BDDDFCA}"/>
-                </a:ext>
-              </a:extLst>
-            </p:cNvPr>
-            <p:cNvPicPr>
-              <a:picLocks noChangeAspect="1"/>
-            </p:cNvPicPr>
-            <p:nvPr/>
-          </p:nvPicPr>
-          <p:blipFill>
-            <a:blip r:embed="rId3">
-              <a:extLst>
-                <a:ext uri="{28A0092B-C50C-407E-A947-70E740481C1C}">
-                  <a14:useLocalDpi xmlns:a14="http://schemas.microsoft.com/office/drawing/2010/main" val="0"/>
-                </a:ext>
-              </a:extLst>
-            </a:blip>
-            <a:stretch>
-              <a:fillRect/>
-            </a:stretch>
-          </p:blipFill>
-          <p:spPr>
-            <a:xfrm>
-              <a:off x="10015678" y="2729419"/>
-              <a:ext cx="1561905" cy="1561905"/>
-            </a:xfrm>
-            <a:prstGeom prst="rect">
-              <a:avLst/>
-            </a:prstGeom>
-          </p:spPr>
-        </p:pic>
-        <p:sp>
-          <p:nvSpPr>
-            <p:cNvPr id="4" name="テキスト ボックス 3">
-              <a:extLst>
-                <a:ext uri="{FF2B5EF4-FFF2-40B4-BE49-F238E27FC236}">
-                  <a16:creationId xmlns:a16="http://schemas.microsoft.com/office/drawing/2014/main" id="{70807B2C-4CDE-416E-9D0E-2A7EFADA821A}"/>
-                </a:ext>
-              </a:extLst>
-            </p:cNvPr>
-            <p:cNvSpPr txBox="1"/>
-            <p:nvPr/>
-          </p:nvSpPr>
-          <p:spPr>
-            <a:xfrm>
-              <a:off x="10484139" y="4369937"/>
-              <a:ext cx="759205" cy="369332"/>
-            </a:xfrm>
-            <a:prstGeom prst="rect">
-              <a:avLst/>
-            </a:prstGeom>
-            <a:noFill/>
-          </p:spPr>
-          <p:txBody>
-            <a:bodyPr wrap="square" rtlCol="0">
-              <a:spAutoFit/>
-            </a:bodyPr>
-            <a:lstStyle/>
-            <a:p>
-              <a:r>
-                <a:rPr kumimoji="1" lang="en-US" altLang="ja-JP" dirty="0"/>
-                <a:t>LINK</a:t>
-              </a:r>
-              <a:endParaRPr kumimoji="1" lang="ja-JP" altLang="en-US" dirty="0"/>
-            </a:p>
-          </p:txBody>
-        </p:sp>
-      </p:grpSp>
     </p:spTree>
     <p:extLst>
       <p:ext uri="{BB962C8B-B14F-4D97-AF65-F5344CB8AC3E}">
@@ -7353,146 +7538,6 @@
           </a:prstGeom>
         </p:spPr>
       </p:pic>
-      <p:grpSp>
-        <p:nvGrpSpPr>
-          <p:cNvPr id="5" name="グループ化 4">
-            <a:extLst>
-              <a:ext uri="{FF2B5EF4-FFF2-40B4-BE49-F238E27FC236}">
-                <a16:creationId xmlns:a16="http://schemas.microsoft.com/office/drawing/2014/main" id="{91181E34-1C70-409F-87FD-6EDE9C48984A}"/>
-              </a:ext>
-            </a:extLst>
-          </p:cNvPr>
-          <p:cNvGrpSpPr/>
-          <p:nvPr/>
-        </p:nvGrpSpPr>
-        <p:grpSpPr>
-          <a:xfrm>
-            <a:off x="8994341" y="2843613"/>
-            <a:ext cx="2063692" cy="2315362"/>
-            <a:chOff x="9764785" y="2550253"/>
-            <a:chExt cx="2063692" cy="2315362"/>
-          </a:xfrm>
-        </p:grpSpPr>
-        <p:sp>
-          <p:nvSpPr>
-            <p:cNvPr id="6" name="正方形/長方形 5">
-              <a:extLst>
-                <a:ext uri="{FF2B5EF4-FFF2-40B4-BE49-F238E27FC236}">
-                  <a16:creationId xmlns:a16="http://schemas.microsoft.com/office/drawing/2014/main" id="{0A86DA04-7F86-4E13-8D98-0D6D8A085D7D}"/>
-                </a:ext>
-              </a:extLst>
-            </p:cNvPr>
-            <p:cNvSpPr/>
-            <p:nvPr/>
-          </p:nvSpPr>
-          <p:spPr>
-            <a:xfrm>
-              <a:off x="9764785" y="2550253"/>
-              <a:ext cx="2063692" cy="2315362"/>
-            </a:xfrm>
-            <a:prstGeom prst="rect">
-              <a:avLst/>
-            </a:prstGeom>
-            <a:noFill/>
-          </p:spPr>
-          <p:style>
-            <a:lnRef idx="2">
-              <a:schemeClr val="accent1">
-                <a:shade val="50000"/>
-              </a:schemeClr>
-            </a:lnRef>
-            <a:fillRef idx="1">
-              <a:schemeClr val="accent1"/>
-            </a:fillRef>
-            <a:effectRef idx="0">
-              <a:schemeClr val="accent1"/>
-            </a:effectRef>
-            <a:fontRef idx="minor">
-              <a:schemeClr val="lt1"/>
-            </a:fontRef>
-          </p:style>
-          <p:txBody>
-            <a:bodyPr rtlCol="0" anchor="ctr"/>
-            <a:lstStyle/>
-            <a:p>
-              <a:pPr algn="ctr"/>
-              <a:endParaRPr kumimoji="1" lang="ja-JP" altLang="en-US"/>
-            </a:p>
-          </p:txBody>
-        </p:sp>
-        <p:pic>
-          <p:nvPicPr>
-            <p:cNvPr id="7" name="コンテンツ プレースホルダー 9">
-              <a:extLst>
-                <a:ext uri="{FF2B5EF4-FFF2-40B4-BE49-F238E27FC236}">
-                  <a16:creationId xmlns:a16="http://schemas.microsoft.com/office/drawing/2014/main" id="{B0D03320-0742-44C0-A5D0-A97FA535A335}"/>
-                </a:ext>
-              </a:extLst>
-            </p:cNvPr>
-            <p:cNvPicPr>
-              <a:picLocks noChangeAspect="1"/>
-            </p:cNvPicPr>
-            <p:nvPr/>
-          </p:nvPicPr>
-          <p:blipFill>
-            <a:blip r:embed="rId3">
-              <a:extLst>
-                <a:ext uri="{28A0092B-C50C-407E-A947-70E740481C1C}">
-                  <a14:useLocalDpi xmlns:a14="http://schemas.microsoft.com/office/drawing/2010/main" val="0"/>
-                </a:ext>
-              </a:extLst>
-            </a:blip>
-            <a:stretch>
-              <a:fillRect/>
-            </a:stretch>
-          </p:blipFill>
-          <p:spPr>
-            <a:xfrm>
-              <a:off x="10015678" y="2729419"/>
-              <a:ext cx="1561905" cy="1561905"/>
-            </a:xfrm>
-            <a:prstGeom prst="rect">
-              <a:avLst/>
-            </a:prstGeom>
-          </p:spPr>
-        </p:pic>
-        <p:sp>
-          <p:nvSpPr>
-            <p:cNvPr id="8" name="テキスト ボックス 7">
-              <a:extLst>
-                <a:ext uri="{FF2B5EF4-FFF2-40B4-BE49-F238E27FC236}">
-                  <a16:creationId xmlns:a16="http://schemas.microsoft.com/office/drawing/2014/main" id="{D2A96A88-501C-44B4-A5FA-65B043194670}"/>
-                </a:ext>
-              </a:extLst>
-            </p:cNvPr>
-            <p:cNvSpPr txBox="1"/>
-            <p:nvPr/>
-          </p:nvSpPr>
-          <p:spPr>
-            <a:xfrm>
-              <a:off x="10484139" y="4369937"/>
-              <a:ext cx="759205" cy="369332"/>
-            </a:xfrm>
-            <a:prstGeom prst="rect">
-              <a:avLst/>
-            </a:prstGeom>
-            <a:noFill/>
-          </p:spPr>
-          <p:txBody>
-            <a:bodyPr wrap="square" rtlCol="0">
-              <a:spAutoFit/>
-            </a:bodyPr>
-            <a:lstStyle/>
-            <a:p>
-              <a:r>
-                <a:rPr kumimoji="1" lang="en-US" altLang="ja-JP" dirty="0"/>
-                <a:t>LINK</a:t>
-              </a:r>
-              <a:endParaRPr kumimoji="1" lang="ja-JP" altLang="en-US" dirty="0"/>
-            </a:p>
-          </p:txBody>
-        </p:sp>
-      </p:grpSp>
     </p:spTree>
     <p:extLst>
       <p:ext uri="{BB962C8B-B14F-4D97-AF65-F5344CB8AC3E}">
@@ -7582,154 +7627,6 @@
           </a:prstGeom>
         </p:spPr>
       </p:pic>
-      <p:grpSp>
-        <p:nvGrpSpPr>
-          <p:cNvPr id="5" name="グループ化 4">
-            <a:extLst>
-              <a:ext uri="{FF2B5EF4-FFF2-40B4-BE49-F238E27FC236}">
-                <a16:creationId xmlns:a16="http://schemas.microsoft.com/office/drawing/2014/main" id="{C0A3FA7C-BEAF-436C-B318-3AE95C5EB6D6}"/>
-              </a:ext>
-            </a:extLst>
-          </p:cNvPr>
-          <p:cNvGrpSpPr/>
-          <p:nvPr/>
-        </p:nvGrpSpPr>
-        <p:grpSpPr>
-          <a:xfrm>
-            <a:off x="8951053" y="3429000"/>
-            <a:ext cx="2063692" cy="2315362"/>
-            <a:chOff x="9764785" y="2550253"/>
-            <a:chExt cx="2063692" cy="2315362"/>
-          </a:xfrm>
-        </p:grpSpPr>
-        <p:sp>
-          <p:nvSpPr>
-            <p:cNvPr id="8" name="正方形/長方形 7">
-              <a:extLst>
-                <a:ext uri="{FF2B5EF4-FFF2-40B4-BE49-F238E27FC236}">
-                  <a16:creationId xmlns:a16="http://schemas.microsoft.com/office/drawing/2014/main" id="{B5BADBBC-261C-40CC-89FC-ED03ABEBAA0F}"/>
-                </a:ext>
-              </a:extLst>
-            </p:cNvPr>
-            <p:cNvSpPr/>
-            <p:nvPr/>
-          </p:nvSpPr>
-          <p:spPr>
-            <a:xfrm>
-              <a:off x="9764785" y="2550253"/>
-              <a:ext cx="2063692" cy="2315362"/>
-            </a:xfrm>
-            <a:prstGeom prst="rect">
-              <a:avLst/>
-            </a:prstGeom>
-            <a:noFill/>
-          </p:spPr>
-          <p:style>
-            <a:lnRef idx="2">
-              <a:schemeClr val="accent1">
-                <a:shade val="50000"/>
-              </a:schemeClr>
-            </a:lnRef>
-            <a:fillRef idx="1">
-              <a:schemeClr val="accent1"/>
-            </a:fillRef>
-            <a:effectRef idx="0">
-              <a:schemeClr val="accent1"/>
-            </a:effectRef>
-            <a:fontRef idx="minor">
-              <a:schemeClr val="lt1"/>
-            </a:fontRef>
-          </p:style>
-          <p:txBody>
-            <a:bodyPr rtlCol="0" anchor="ctr"/>
-            <a:lstStyle/>
-            <a:p>
-              <a:pPr algn="ctr"/>
-              <a:endParaRPr kumimoji="1" lang="ja-JP" altLang="en-US"/>
-            </a:p>
-          </p:txBody>
-        </p:sp>
-        <p:pic>
-          <p:nvPicPr>
-            <p:cNvPr id="9" name="コンテンツ プレースホルダー 9">
-              <a:extLst>
-                <a:ext uri="{FF2B5EF4-FFF2-40B4-BE49-F238E27FC236}">
-                  <a16:creationId xmlns:a16="http://schemas.microsoft.com/office/drawing/2014/main" id="{A8C2A90B-1CF8-47B6-9FE5-AA260EA18D8E}"/>
-                </a:ext>
-              </a:extLst>
-            </p:cNvPr>
-            <p:cNvPicPr>
-              <a:picLocks noChangeAspect="1"/>
-            </p:cNvPicPr>
-            <p:nvPr/>
-          </p:nvPicPr>
-          <p:blipFill>
-            <a:blip r:embed="rId3">
-              <a:extLst>
-                <a:ext uri="{28A0092B-C50C-407E-A947-70E740481C1C}">
-                  <a14:useLocalDpi xmlns:a14="http://schemas.microsoft.com/office/drawing/2010/main" val="0"/>
-                </a:ext>
-              </a:extLst>
-            </a:blip>
-            <a:stretch>
-              <a:fillRect/>
-            </a:stretch>
-          </p:blipFill>
-          <p:spPr>
-            <a:xfrm>
-              <a:off x="10015678" y="2729419"/>
-              <a:ext cx="1561905" cy="1561905"/>
-            </a:xfrm>
-            <a:prstGeom prst="rect">
-              <a:avLst/>
-            </a:prstGeom>
-          </p:spPr>
-        </p:pic>
-        <p:sp>
-          <p:nvSpPr>
-            <p:cNvPr id="10" name="テキスト ボックス 9">
-              <a:extLst>
-                <a:ext uri="{FF2B5EF4-FFF2-40B4-BE49-F238E27FC236}">
-                  <a16:creationId xmlns:a16="http://schemas.microsoft.com/office/drawing/2014/main" id="{95D31DBA-13C5-4A66-837C-FAC11361DB9B}"/>
-                </a:ext>
-              </a:extLst>
-            </p:cNvPr>
-            <p:cNvSpPr txBox="1"/>
-            <p:nvPr/>
-          </p:nvSpPr>
-          <p:spPr>
-            <a:xfrm>
-              <a:off x="10484139" y="4369937"/>
-              <a:ext cx="759205" cy="369332"/>
-            </a:xfrm>
-            <a:prstGeom prst="rect">
-              <a:avLst/>
-            </a:prstGeom>
-            <a:noFill/>
-          </p:spPr>
-          <p:txBody>
-            <a:bodyPr wrap="square" rtlCol="0">
-              <a:spAutoFit/>
-            </a:bodyPr>
-            <a:lstStyle/>
-            <a:p>
-              <a:r>
-                <a:rPr kumimoji="1" lang="en-US" altLang="ja-JP" dirty="0">
-                  <a:solidFill>
-                    <a:schemeClr val="bg1"/>
-                  </a:solidFill>
-                </a:rPr>
-                <a:t>LINK</a:t>
-              </a:r>
-              <a:endParaRPr kumimoji="1" lang="ja-JP" altLang="en-US" dirty="0">
-                <a:solidFill>
-                  <a:schemeClr val="bg1"/>
-                </a:solidFill>
-              </a:endParaRPr>
-            </a:p>
-          </p:txBody>
-        </p:sp>
-      </p:grpSp>
     </p:spTree>
     <p:extLst>
       <p:ext uri="{BB962C8B-B14F-4D97-AF65-F5344CB8AC3E}">
@@ -7789,8 +7686,8 @@
           </a:p>
         </p:txBody>
       </p:sp>
-      <mc:AlternateContent xmlns:mc="http://schemas.openxmlformats.org/markup-compatibility/2006">
-        <mc:Choice xmlns:a14="http://schemas.microsoft.com/office/drawing/2010/main" Requires="a14">
+      <mc:AlternateContent xmlns:mc="http://schemas.openxmlformats.org/markup-compatibility/2006" xmlns:a14="http://schemas.microsoft.com/office/drawing/2010/main">
+        <mc:Choice Requires="a14">
           <p:sp>
             <p:nvSpPr>
               <p:cNvPr id="3" name="コンテンツ プレースホルダー 2">
@@ -8530,7 +8427,7 @@
             </p:txBody>
           </p:sp>
         </mc:Choice>
-        <mc:Fallback>
+        <mc:Fallback xmlns="">
           <p:sp>
             <p:nvSpPr>
               <p:cNvPr id="3" name="コンテンツ プレースホルダー 2">
@@ -9602,7 +9499,7 @@
                         <a:rPr kumimoji="1" lang="en-US" altLang="ja-JP" b="0" i="1" smtClean="0">
                           <a:latin typeface="Cambria Math" panose="02040503050406030204" pitchFamily="18" charset="0"/>
                         </a:rPr>
-                        <m:t>𝑚𝑎𝑧𝑒</m:t>
+                        <m:t>𝑚𝑎𝑝</m:t>
                       </m:r>
                       <m:r>
                         <a:rPr lang="ja-JP" altLang="en-US" i="1">

</xml_diff>

<commit_message>
modified:   do_actions.c 	modified:   presentation.pptx
</commit_message>
<xml_diff>
--- a/presentation.pptx
+++ b/presentation.pptx
@@ -208,7 +208,7 @@
           <a:p>
             <a:fld id="{DACD13BE-CFF8-4274-8F33-E17667936FF0}" type="datetimeFigureOut">
               <a:rPr kumimoji="1" lang="ja-JP" altLang="en-US" smtClean="0"/>
-              <a:t>2021/5/10</a:t>
+              <a:t>2021/5/12</a:t>
             </a:fld>
             <a:endParaRPr kumimoji="1" lang="ja-JP" altLang="en-US"/>
           </a:p>
@@ -1397,7 +1397,7 @@
           <a:p>
             <a:fld id="{2D3307F4-2003-445F-80EA-0A6F700AA6C1}" type="datetimeFigureOut">
               <a:rPr kumimoji="1" lang="ja-JP" altLang="en-US" smtClean="0"/>
-              <a:t>2021/5/10</a:t>
+              <a:t>2021/5/12</a:t>
             </a:fld>
             <a:endParaRPr kumimoji="1" lang="ja-JP" altLang="en-US"/>
           </a:p>
@@ -1648,7 +1648,7 @@
           <a:p>
             <a:fld id="{2D3307F4-2003-445F-80EA-0A6F700AA6C1}" type="datetimeFigureOut">
               <a:rPr kumimoji="1" lang="ja-JP" altLang="en-US" smtClean="0"/>
-              <a:t>2021/5/10</a:t>
+              <a:t>2021/5/12</a:t>
             </a:fld>
             <a:endParaRPr kumimoji="1" lang="ja-JP" altLang="en-US"/>
           </a:p>
@@ -1962,7 +1962,7 @@
           <a:p>
             <a:fld id="{2D3307F4-2003-445F-80EA-0A6F700AA6C1}" type="datetimeFigureOut">
               <a:rPr kumimoji="1" lang="ja-JP" altLang="en-US" smtClean="0"/>
-              <a:t>2021/5/10</a:t>
+              <a:t>2021/5/12</a:t>
             </a:fld>
             <a:endParaRPr kumimoji="1" lang="ja-JP" altLang="en-US"/>
           </a:p>
@@ -2303,7 +2303,7 @@
           <a:p>
             <a:fld id="{2D3307F4-2003-445F-80EA-0A6F700AA6C1}" type="datetimeFigureOut">
               <a:rPr kumimoji="1" lang="ja-JP" altLang="en-US" smtClean="0"/>
-              <a:t>2021/5/10</a:t>
+              <a:t>2021/5/12</a:t>
             </a:fld>
             <a:endParaRPr kumimoji="1" lang="ja-JP" altLang="en-US"/>
           </a:p>
@@ -2617,7 +2617,7 @@
           <a:p>
             <a:fld id="{2D3307F4-2003-445F-80EA-0A6F700AA6C1}" type="datetimeFigureOut">
               <a:rPr kumimoji="1" lang="ja-JP" altLang="en-US" smtClean="0"/>
-              <a:t>2021/5/10</a:t>
+              <a:t>2021/5/12</a:t>
             </a:fld>
             <a:endParaRPr kumimoji="1" lang="ja-JP" altLang="en-US"/>
           </a:p>
@@ -3010,7 +3010,7 @@
           <a:p>
             <a:fld id="{2D3307F4-2003-445F-80EA-0A6F700AA6C1}" type="datetimeFigureOut">
               <a:rPr kumimoji="1" lang="ja-JP" altLang="en-US" smtClean="0"/>
-              <a:t>2021/5/10</a:t>
+              <a:t>2021/5/12</a:t>
             </a:fld>
             <a:endParaRPr kumimoji="1" lang="ja-JP" altLang="en-US"/>
           </a:p>
@@ -3212,7 +3212,7 @@
           <a:p>
             <a:fld id="{2D3307F4-2003-445F-80EA-0A6F700AA6C1}" type="datetimeFigureOut">
               <a:rPr kumimoji="1" lang="ja-JP" altLang="en-US" smtClean="0"/>
-              <a:t>2021/5/10</a:t>
+              <a:t>2021/5/12</a:t>
             </a:fld>
             <a:endParaRPr kumimoji="1" lang="ja-JP" altLang="en-US"/>
           </a:p>
@@ -3424,7 +3424,7 @@
           <a:p>
             <a:fld id="{2D3307F4-2003-445F-80EA-0A6F700AA6C1}" type="datetimeFigureOut">
               <a:rPr kumimoji="1" lang="ja-JP" altLang="en-US" smtClean="0"/>
-              <a:t>2021/5/10</a:t>
+              <a:t>2021/5/12</a:t>
             </a:fld>
             <a:endParaRPr kumimoji="1" lang="ja-JP" altLang="en-US"/>
           </a:p>
@@ -3632,7 +3632,7 @@
           <a:p>
             <a:fld id="{2D3307F4-2003-445F-80EA-0A6F700AA6C1}" type="datetimeFigureOut">
               <a:rPr kumimoji="1" lang="ja-JP" altLang="en-US" smtClean="0"/>
-              <a:t>2021/5/10</a:t>
+              <a:t>2021/5/12</a:t>
             </a:fld>
             <a:endParaRPr kumimoji="1" lang="ja-JP" altLang="en-US"/>
           </a:p>
@@ -3879,7 +3879,7 @@
           <a:p>
             <a:fld id="{2D3307F4-2003-445F-80EA-0A6F700AA6C1}" type="datetimeFigureOut">
               <a:rPr kumimoji="1" lang="ja-JP" altLang="en-US" smtClean="0"/>
-              <a:t>2021/5/10</a:t>
+              <a:t>2021/5/12</a:t>
             </a:fld>
             <a:endParaRPr kumimoji="1" lang="ja-JP" altLang="en-US"/>
           </a:p>
@@ -4175,7 +4175,7 @@
           <a:p>
             <a:fld id="{2D3307F4-2003-445F-80EA-0A6F700AA6C1}" type="datetimeFigureOut">
               <a:rPr kumimoji="1" lang="ja-JP" altLang="en-US" smtClean="0"/>
-              <a:t>2021/5/10</a:t>
+              <a:t>2021/5/12</a:t>
             </a:fld>
             <a:endParaRPr kumimoji="1" lang="ja-JP" altLang="en-US"/>
           </a:p>
@@ -4613,7 +4613,7 @@
           <a:p>
             <a:fld id="{2D3307F4-2003-445F-80EA-0A6F700AA6C1}" type="datetimeFigureOut">
               <a:rPr kumimoji="1" lang="ja-JP" altLang="en-US" smtClean="0"/>
-              <a:t>2021/5/10</a:t>
+              <a:t>2021/5/12</a:t>
             </a:fld>
             <a:endParaRPr kumimoji="1" lang="ja-JP" altLang="en-US"/>
           </a:p>
@@ -4736,7 +4736,7 @@
           <a:p>
             <a:fld id="{2D3307F4-2003-445F-80EA-0A6F700AA6C1}" type="datetimeFigureOut">
               <a:rPr kumimoji="1" lang="ja-JP" altLang="en-US" smtClean="0"/>
-              <a:t>2021/5/10</a:t>
+              <a:t>2021/5/12</a:t>
             </a:fld>
             <a:endParaRPr kumimoji="1" lang="ja-JP" altLang="en-US"/>
           </a:p>
@@ -4831,7 +4831,7 @@
           <a:p>
             <a:fld id="{2D3307F4-2003-445F-80EA-0A6F700AA6C1}" type="datetimeFigureOut">
               <a:rPr kumimoji="1" lang="ja-JP" altLang="en-US" smtClean="0"/>
-              <a:t>2021/5/10</a:t>
+              <a:t>2021/5/12</a:t>
             </a:fld>
             <a:endParaRPr kumimoji="1" lang="ja-JP" altLang="en-US"/>
           </a:p>
@@ -5118,7 +5118,7 @@
           <a:p>
             <a:fld id="{2D3307F4-2003-445F-80EA-0A6F700AA6C1}" type="datetimeFigureOut">
               <a:rPr kumimoji="1" lang="ja-JP" altLang="en-US" smtClean="0"/>
-              <a:t>2021/5/10</a:t>
+              <a:t>2021/5/12</a:t>
             </a:fld>
             <a:endParaRPr kumimoji="1" lang="ja-JP" altLang="en-US"/>
           </a:p>
@@ -5381,7 +5381,7 @@
           <a:p>
             <a:fld id="{2D3307F4-2003-445F-80EA-0A6F700AA6C1}" type="datetimeFigureOut">
               <a:rPr kumimoji="1" lang="ja-JP" altLang="en-US" smtClean="0"/>
-              <a:t>2021/5/10</a:t>
+              <a:t>2021/5/12</a:t>
             </a:fld>
             <a:endParaRPr kumimoji="1" lang="ja-JP" altLang="en-US"/>
           </a:p>
@@ -6156,7 +6156,7 @@
           <a:p>
             <a:fld id="{2D3307F4-2003-445F-80EA-0A6F700AA6C1}" type="datetimeFigureOut">
               <a:rPr kumimoji="1" lang="ja-JP" altLang="en-US" smtClean="0"/>
-              <a:t>2021/5/10</a:t>
+              <a:t>2021/5/12</a:t>
             </a:fld>
             <a:endParaRPr kumimoji="1" lang="ja-JP" altLang="en-US"/>
           </a:p>
@@ -8624,14 +8624,10 @@
             </a:pPr>
             <a:r>
               <a:rPr lang="ja-JP" altLang="en-US" dirty="0"/>
-              <a:t>プログラムの開始</a:t>
-            </a:r>
-            <a:r>
-              <a:rPr lang="ja-JP" altLang="en-US"/>
-              <a:t>位置。</a:t>
-            </a:r>
-            <a:r>
-              <a:rPr lang="en-US" altLang="ja-JP"/>
+              <a:t>プログラムの開始位置。</a:t>
+            </a:r>
+            <a:r>
+              <a:rPr lang="en-US" altLang="ja-JP" dirty="0"/>
               <a:t>action</a:t>
             </a:r>
             <a:r>
@@ -9439,7 +9435,7 @@
                         <a:rPr lang="en-US" altLang="ja-JP" b="0" i="1" smtClean="0">
                           <a:latin typeface="Cambria Math" panose="02040503050406030204" pitchFamily="18" charset="0"/>
                         </a:rPr>
-                        <m:t>𝑚𝑎𝑧𝑒</m:t>
+                        <m:t>𝑚𝑎𝑝</m:t>
                       </m:r>
                       <m:r>
                         <a:rPr lang="ja-JP" altLang="en-US" i="1">

</xml_diff>